<commit_message>
acu se vede mai bine
</commit_message>
<xml_diff>
--- a/Tema cu sortari.pptx
+++ b/Tema cu sortari.pptx
@@ -10006,7 +10006,7 @@
             <a:tbl>
               <a:tblPr>
                 <a:noFill/>
-                <a:tableStyleId>{74F9344E-F1E6-4AAA-90DF-074D5BD38FC0}</a:tableStyleId>
+                <a:tableStyleId>{E68A2730-458A-4F07-87C5-3FEA1DDB610E}</a:tableStyleId>
               </a:tblPr>
               <a:tblGrid>
                 <a:gridCol w="725350"/>
@@ -16570,7 +16570,7 @@
             <a:tbl>
               <a:tblPr>
                 <a:noFill/>
-                <a:tableStyleId>{74F9344E-F1E6-4AAA-90DF-074D5BD38FC0}</a:tableStyleId>
+                <a:tableStyleId>{E68A2730-458A-4F07-87C5-3FEA1DDB610E}</a:tableStyleId>
               </a:tblPr>
               <a:tblGrid>
                 <a:gridCol w="1223925"/>
@@ -18549,7 +18549,7 @@
             <a:tbl>
               <a:tblPr>
                 <a:noFill/>
-                <a:tableStyleId>{74F9344E-F1E6-4AAA-90DF-074D5BD38FC0}</a:tableStyleId>
+                <a:tableStyleId>{E68A2730-458A-4F07-87C5-3FEA1DDB610E}</a:tableStyleId>
               </a:tblPr>
               <a:tblGrid>
                 <a:gridCol w="1285025"/>
@@ -20591,7 +20591,7 @@
         </p:spPr>
         <p:txBody>
           <a:bodyPr anchorCtr="0" anchor="t" bIns="91425" lIns="91425" spcFirstLastPara="1" rIns="91425" wrap="square" tIns="91425">
-            <a:normAutofit fontScale="47500"/>
+            <a:normAutofit fontScale="85000" lnSpcReduction="20000"/>
           </a:bodyPr>
           <a:lstStyle/>
           <a:p>
@@ -20605,10 +20605,10 @@
               <a:buNone/>
             </a:pPr>
             <a:r>
-              <a:rPr lang="en" sz="1681"/>
+              <a:rPr lang="en" sz="986"/>
               <a:t>TimSort este clar cel mai rapid pe inputuri mici, chiar daca are un avantaj nemeritat, totusi sorteaza greu pe inputuri mari, deoarece (teoretic) el e facut să caute structuri deja ordonarte fiind creeat pentru a sorta date din lumea reala care au o tendinta să fie semi-sortate. In proiect, listele au fost generate aleator, acesta ar putea fi un motiv pentru care nu este in top.</a:t>
             </a:r>
-            <a:endParaRPr sz="1681"/>
+            <a:endParaRPr sz="986"/>
           </a:p>
           <a:p>
             <a:pPr indent="0" lvl="0" marL="0" rtl="0" algn="l">
@@ -20621,10 +20621,10 @@
               <a:buNone/>
             </a:pPr>
             <a:r>
-              <a:rPr lang="en" sz="1681"/>
+              <a:rPr lang="en" sz="986"/>
               <a:t>MergSort e mai rapid pe inputuri unde N e mic, deoarece are mai putine interclasari și recursii de facut. Se poate observa un platou la testele 5 și 6, desi max difera radical ceea ce ar sustine argumentul ca MergeSort tine cont doar de lungimea vectorului.</a:t>
             </a:r>
-            <a:endParaRPr sz="1681"/>
+            <a:endParaRPr sz="986"/>
           </a:p>
           <a:p>
             <a:pPr indent="0" lvl="0" marL="0" rtl="0" algn="l">
@@ -20807,8 +20807,8 @@
         </p:blipFill>
         <p:spPr>
           <a:xfrm>
-            <a:off x="4252574" y="2093950"/>
-            <a:ext cx="4925476" cy="3049550"/>
+            <a:off x="5096650" y="2616550"/>
+            <a:ext cx="4081398" cy="2526950"/>
           </a:xfrm>
           <a:prstGeom prst="rect">
             <a:avLst/>
@@ -20947,7 +20947,7 @@
             <a:r>
               <a:rPr lang="en" sz="800">
                 <a:highlight>
-                  <a:srgbClr val="000000"/>
+                  <a:schemeClr val="lt1"/>
                 </a:highlight>
               </a:rPr>
               <a:t>CountingSort</a:t>
@@ -21125,7 +21125,7 @@
             <a:tbl>
               <a:tblPr>
                 <a:noFill/>
-                <a:tableStyleId>{156C0DEF-0467-4CC3-8134-2B342B6D788F}</a:tableStyleId>
+                <a:tableStyleId>{C08275B0-1EAC-4C55-B966-AC7E85C145AB}</a:tableStyleId>
               </a:tblPr>
               <a:tblGrid>
                 <a:gridCol w="997200"/>
@@ -22209,7 +22209,7 @@
         </p:nvSpPr>
         <p:spPr>
           <a:xfrm>
-            <a:off x="2061250" y="3605350"/>
+            <a:off x="2346925" y="3605350"/>
             <a:ext cx="588000" cy="615600"/>
           </a:xfrm>
           <a:prstGeom prst="rect">
@@ -22573,7 +22573,7 @@
         <p:spPr>
           <a:xfrm>
             <a:off x="473125" y="3572550"/>
-            <a:ext cx="1620900" cy="323100"/>
+            <a:ext cx="2721600" cy="323100"/>
           </a:xfrm>
           <a:prstGeom prst="rect">
             <a:avLst/>

</xml_diff>